<commit_message>
update to -s13 version of slides
</commit_message>
<xml_diff>
--- a/spring13/slides13/recursive-functions.pptx
+++ b/spring13/slides13/recursive-functions.pptx
@@ -2778,12 +2778,12 @@
               <a:defRPr/>
             </a:pPr>
             <a:r>
+              <a:rPr lang="en-US" dirty="0" err="1" smtClean="0"/>
+              <a:t>recursivefunctions</a:t>
+            </a:r>
+            <a:r>
               <a:rPr lang="en-US" dirty="0" smtClean="0"/>
-              <a:t>lec </a:t>
-            </a:r>
-            <a:r>
-              <a:rPr lang="en-US" dirty="0" smtClean="0"/>
-              <a:t>4W.</a:t>
+              <a:t>.</a:t>
             </a:r>
             <a:fld id="{2C84FE54-9186-40A1-B2A6-72C42D6F8BE5}" type="slidenum">
               <a:rPr lang="en-US" smtClean="0"/>
@@ -2915,8 +2915,8 @@
         </p:nvSpPr>
         <p:spPr>
           <a:xfrm>
-            <a:off x="8153400" y="6629399"/>
-            <a:ext cx="990600" cy="228601"/>
+            <a:off x="6781800" y="6553201"/>
+            <a:ext cx="2362200" cy="304800"/>
           </a:xfrm>
           <a:prstGeom prst="rect">
             <a:avLst/>
@@ -2939,12 +2939,12 @@
               <a:defRPr/>
             </a:pPr>
             <a:r>
+              <a:rPr lang="en-US" dirty="0" err="1" smtClean="0"/>
+              <a:t>recursivefunctions</a:t>
+            </a:r>
+            <a:r>
               <a:rPr lang="en-US" dirty="0" smtClean="0"/>
-              <a:t>lec </a:t>
-            </a:r>
-            <a:r>
-              <a:rPr lang="en-US" dirty="0" smtClean="0"/>
-              <a:t>4W.</a:t>
+              <a:t>.</a:t>
             </a:r>
             <a:fld id="{2C84FE54-9186-40A1-B2A6-72C42D6F8BE5}" type="slidenum">
               <a:rPr lang="en-US" smtClean="0"/>
@@ -3122,12 +3122,12 @@
               <a:defRPr/>
             </a:pPr>
             <a:r>
+              <a:rPr lang="en-US" dirty="0" err="1" smtClean="0"/>
+              <a:t>recursivefunctions</a:t>
+            </a:r>
+            <a:r>
               <a:rPr lang="en-US" dirty="0" smtClean="0"/>
-              <a:t>lec </a:t>
-            </a:r>
-            <a:r>
-              <a:rPr lang="en-US" dirty="0" smtClean="0"/>
-              <a:t>4W.</a:t>
+              <a:t>.</a:t>
             </a:r>
             <a:fld id="{2C84FE54-9186-40A1-B2A6-72C42D6F8BE5}" type="slidenum">
               <a:rPr lang="en-US" smtClean="0"/>
@@ -3231,12 +3231,12 @@
               <a:defRPr/>
             </a:pPr>
             <a:r>
+              <a:rPr lang="en-US" dirty="0" err="1" smtClean="0"/>
+              <a:t>recursivefunctions</a:t>
+            </a:r>
+            <a:r>
               <a:rPr lang="en-US" dirty="0" smtClean="0"/>
-              <a:t>lec </a:t>
-            </a:r>
-            <a:r>
-              <a:rPr lang="en-US" dirty="0" smtClean="0"/>
-              <a:t>4W.</a:t>
+              <a:t>.</a:t>
             </a:r>
             <a:fld id="{2C84FE54-9186-40A1-B2A6-72C42D6F8BE5}" type="slidenum">
               <a:rPr lang="en-US" smtClean="0"/>
@@ -3317,12 +3317,12 @@
               <a:defRPr/>
             </a:pPr>
             <a:r>
+              <a:rPr lang="en-US" dirty="0" err="1" smtClean="0"/>
+              <a:t>recursivefunctions</a:t>
+            </a:r>
+            <a:r>
               <a:rPr lang="en-US" dirty="0" smtClean="0"/>
-              <a:t>lec </a:t>
-            </a:r>
-            <a:r>
-              <a:rPr lang="en-US" dirty="0" smtClean="0"/>
-              <a:t>4W.</a:t>
+              <a:t>.</a:t>
             </a:r>
             <a:fld id="{2C84FE54-9186-40A1-B2A6-72C42D6F8BE5}" type="slidenum">
               <a:rPr lang="en-US" smtClean="0"/>
@@ -3347,173 +3347,6 @@
       </p:par>
     </p:tnLst>
   </p:timing>
-</p:sldLayout>
-</file>
-
-<file path=ppt/slideLayouts/slideLayout6.xml><?xml version="1.0" encoding="utf-8"?>
-<p:sldLayout xmlns:a="http://schemas.openxmlformats.org/drawingml/2006/main" xmlns:r="http://schemas.openxmlformats.org/officeDocument/2006/relationships" xmlns:p="http://schemas.openxmlformats.org/presentationml/2006/main" type="txAndObj" preserve="1">
-  <p:cSld name="Title, Text, and Content">
-    <p:spTree>
-      <p:nvGrpSpPr>
-        <p:cNvPr id="1" name=""/>
-        <p:cNvGrpSpPr/>
-        <p:nvPr/>
-      </p:nvGrpSpPr>
-      <p:grpSpPr>
-        <a:xfrm>
-          <a:off x="0" y="0"/>
-          <a:ext cx="0" cy="0"/>
-          <a:chOff x="0" y="0"/>
-          <a:chExt cx="0" cy="0"/>
-        </a:xfrm>
-      </p:grpSpPr>
-      <p:sp>
-        <p:nvSpPr>
-          <p:cNvPr id="2" name="Title 1"/>
-          <p:cNvSpPr>
-            <a:spLocks noGrp="1"/>
-          </p:cNvSpPr>
-          <p:nvPr>
-            <p:ph type="title"/>
-          </p:nvPr>
-        </p:nvSpPr>
-        <p:spPr>
-          <a:xfrm>
-            <a:off x="1447800" y="0"/>
-            <a:ext cx="7543800" cy="1143000"/>
-          </a:xfrm>
-        </p:spPr>
-        <p:txBody>
-          <a:bodyPr/>
-          <a:lstStyle/>
-          <a:p>
-            <a:r>
-              <a:rPr lang="en-US" smtClean="0"/>
-              <a:t>Click to edit Master title style</a:t>
-            </a:r>
-            <a:endParaRPr lang="en-US"/>
-          </a:p>
-        </p:txBody>
-      </p:sp>
-      <p:sp>
-        <p:nvSpPr>
-          <p:cNvPr id="3" name="Text Placeholder 2"/>
-          <p:cNvSpPr>
-            <a:spLocks noGrp="1"/>
-          </p:cNvSpPr>
-          <p:nvPr>
-            <p:ph type="body" sz="half" idx="1"/>
-          </p:nvPr>
-        </p:nvSpPr>
-        <p:spPr>
-          <a:xfrm>
-            <a:off x="676275" y="1147763"/>
-            <a:ext cx="3810000" cy="4654550"/>
-          </a:xfrm>
-        </p:spPr>
-        <p:txBody>
-          <a:bodyPr/>
-          <a:lstStyle/>
-          <a:p>
-            <a:pPr lvl="0"/>
-            <a:r>
-              <a:rPr lang="en-US" smtClean="0"/>
-              <a:t>Click to edit Master text styles</a:t>
-            </a:r>
-          </a:p>
-          <a:p>
-            <a:pPr lvl="1"/>
-            <a:r>
-              <a:rPr lang="en-US" smtClean="0"/>
-              <a:t>Second level</a:t>
-            </a:r>
-          </a:p>
-          <a:p>
-            <a:pPr lvl="2"/>
-            <a:r>
-              <a:rPr lang="en-US" smtClean="0"/>
-              <a:t>Third level</a:t>
-            </a:r>
-          </a:p>
-          <a:p>
-            <a:pPr lvl="3"/>
-            <a:r>
-              <a:rPr lang="en-US" smtClean="0"/>
-              <a:t>Fourth level</a:t>
-            </a:r>
-          </a:p>
-          <a:p>
-            <a:pPr lvl="4"/>
-            <a:r>
-              <a:rPr lang="en-US" smtClean="0"/>
-              <a:t>Fifth level</a:t>
-            </a:r>
-            <a:endParaRPr lang="en-US"/>
-          </a:p>
-        </p:txBody>
-      </p:sp>
-      <p:sp>
-        <p:nvSpPr>
-          <p:cNvPr id="4" name="Content Placeholder 3"/>
-          <p:cNvSpPr>
-            <a:spLocks noGrp="1"/>
-          </p:cNvSpPr>
-          <p:nvPr>
-            <p:ph sz="half" idx="2"/>
-          </p:nvPr>
-        </p:nvSpPr>
-        <p:spPr>
-          <a:xfrm>
-            <a:off x="4638675" y="1147763"/>
-            <a:ext cx="3810000" cy="4654550"/>
-          </a:xfrm>
-        </p:spPr>
-        <p:txBody>
-          <a:bodyPr/>
-          <a:lstStyle/>
-          <a:p>
-            <a:pPr lvl="0"/>
-            <a:r>
-              <a:rPr lang="en-US" smtClean="0"/>
-              <a:t>Click to edit Master text styles</a:t>
-            </a:r>
-          </a:p>
-          <a:p>
-            <a:pPr lvl="1"/>
-            <a:r>
-              <a:rPr lang="en-US" smtClean="0"/>
-              <a:t>Second level</a:t>
-            </a:r>
-          </a:p>
-          <a:p>
-            <a:pPr lvl="2"/>
-            <a:r>
-              <a:rPr lang="en-US" smtClean="0"/>
-              <a:t>Third level</a:t>
-            </a:r>
-          </a:p>
-          <a:p>
-            <a:pPr lvl="3"/>
-            <a:r>
-              <a:rPr lang="en-US" smtClean="0"/>
-              <a:t>Fourth level</a:t>
-            </a:r>
-          </a:p>
-          <a:p>
-            <a:pPr lvl="4"/>
-            <a:r>
-              <a:rPr lang="en-US" smtClean="0"/>
-              <a:t>Fifth level</a:t>
-            </a:r>
-            <a:endParaRPr lang="en-US"/>
-          </a:p>
-        </p:txBody>
-      </p:sp>
-    </p:spTree>
-  </p:cSld>
-  <p:clrMapOvr>
-    <a:masterClrMapping/>
-  </p:clrMapOvr>
 </p:sldLayout>
 </file>
 
@@ -3663,7 +3496,7 @@
           <p:nvPr/>
         </p:nvPicPr>
         <p:blipFill>
-          <a:blip r:embed="rId8"/>
+          <a:blip r:embed="rId7"/>
           <a:srcRect/>
           <a:stretch>
             <a:fillRect/>
@@ -3698,8 +3531,8 @@
         </p:nvSpPr>
         <p:spPr>
           <a:xfrm>
-            <a:off x="8153400" y="6629399"/>
-            <a:ext cx="990600" cy="228601"/>
+            <a:off x="6934200" y="6553201"/>
+            <a:ext cx="2209800" cy="304800"/>
           </a:xfrm>
           <a:prstGeom prst="rect">
             <a:avLst/>
@@ -3723,11 +3556,11 @@
             </a:pPr>
             <a:r>
               <a:rPr lang="en-US" dirty="0" err="1" smtClean="0"/>
-              <a:t>lec</a:t>
+              <a:t>recursivefunctions</a:t>
             </a:r>
             <a:r>
               <a:rPr lang="en-US" dirty="0" smtClean="0"/>
-              <a:t> 4W.</a:t>
+              <a:t>.</a:t>
             </a:r>
             <a:fld id="{2C84FE54-9186-40A1-B2A6-72C42D6F8BE5}" type="slidenum">
               <a:rPr lang="en-US" smtClean="0"/>
@@ -3791,7 +3624,22 @@
                 <a:uFillTx/>
                 <a:latin typeface="Comic Sans MS" pitchFamily="66" charset="0"/>
               </a:rPr>
-              <a:t>Albert R Meyer,   February 29, 2012</a:t>
+              <a:t>Albert R Meyer,   </a:t>
+            </a:r>
+            <a:r>
+              <a:rPr kumimoji="0" lang="en-US" sz="1200" b="0" i="0" u="none" strike="noStrike" kern="1200" cap="none" spc="0" normalizeH="0" baseline="0" noProof="0" dirty="0" smtClean="0">
+                <a:ln>
+                  <a:noFill/>
+                </a:ln>
+                <a:solidFill>
+                  <a:schemeClr val="tx1"/>
+                </a:solidFill>
+                <a:effectLst/>
+                <a:uLnTx/>
+                <a:uFillTx/>
+                <a:latin typeface="Comic Sans MS" pitchFamily="66" charset="0"/>
+              </a:rPr>
+              <a:t>March 1, 2013</a:t>
             </a:r>
             <a:endParaRPr kumimoji="0" lang="en-US" sz="1200" b="0" i="0" u="none" strike="noStrike" kern="1200" cap="none" spc="0" normalizeH="0" baseline="0" noProof="0" dirty="0">
               <a:ln>
@@ -3817,7 +3665,7 @@
           <p:nvPr userDrawn="1"/>
         </p:nvPicPr>
         <p:blipFill>
-          <a:blip r:embed="rId9"/>
+          <a:blip r:embed="rId8"/>
           <a:stretch>
             <a:fillRect/>
           </a:stretch>
@@ -3841,7 +3689,6 @@
     <p:sldLayoutId id="2147483736" r:id="rId3"/>
     <p:sldLayoutId id="2147483730" r:id="rId4"/>
     <p:sldLayoutId id="2147483731" r:id="rId5"/>
-    <p:sldLayoutId id="2147483743" r:id="rId6"/>
   </p:sldLayoutIdLst>
   <p:timing>
     <p:tnLst>
@@ -4250,8 +4097,8 @@
         </p:nvSpPr>
         <p:spPr bwMode="auto">
           <a:xfrm>
-            <a:off x="7999413" y="6515100"/>
-            <a:ext cx="1068387" cy="304800"/>
+            <a:off x="7010401" y="6553200"/>
+            <a:ext cx="2057400" cy="266700"/>
           </a:xfrm>
           <a:noFill/>
           <a:ln>
@@ -4269,12 +4116,12 @@
           <a:lstStyle/>
           <a:p>
             <a:r>
+              <a:rPr lang="en-US" dirty="0" err="1" smtClean="0"/>
+              <a:t>recursivefunctions</a:t>
+            </a:r>
+            <a:r>
               <a:rPr lang="en-US" dirty="0" smtClean="0"/>
-              <a:t>lec </a:t>
-            </a:r>
-            <a:r>
-              <a:rPr lang="en-US" dirty="0" smtClean="0"/>
-              <a:t>4W.</a:t>
+              <a:t>.</a:t>
             </a:r>
             <a:fld id="{882D82BC-455A-46A4-B2BB-34843D25408C}" type="slidenum">
               <a:rPr lang="en-US" smtClean="0"/>
@@ -5474,8 +5321,8 @@
         </p:nvSpPr>
         <p:spPr bwMode="auto">
           <a:xfrm>
-            <a:off x="7999413" y="6515100"/>
-            <a:ext cx="1068387" cy="304800"/>
+            <a:off x="7162801" y="6477000"/>
+            <a:ext cx="1905000" cy="342900"/>
           </a:xfrm>
           <a:noFill/>
           <a:ln>
@@ -5493,12 +5340,12 @@
           <a:lstStyle/>
           <a:p>
             <a:r>
+              <a:rPr lang="en-US" dirty="0" err="1" smtClean="0"/>
+              <a:t>recursivefunctions</a:t>
+            </a:r>
+            <a:r>
               <a:rPr lang="en-US" dirty="0" smtClean="0"/>
-              <a:t>lec </a:t>
-            </a:r>
-            <a:r>
-              <a:rPr lang="en-US" dirty="0" smtClean="0"/>
-              <a:t>4W.</a:t>
+              <a:t>.</a:t>
             </a:r>
             <a:fld id="{A4AC7DF5-7AF0-41A2-94AE-19E802825938}" type="slidenum">
               <a:rPr lang="en-US" smtClean="0"/>
@@ -5856,8 +5703,8 @@
         </p:nvSpPr>
         <p:spPr bwMode="auto">
           <a:xfrm>
-            <a:off x="7999413" y="6515100"/>
-            <a:ext cx="1068387" cy="304800"/>
+            <a:off x="7315201" y="6553200"/>
+            <a:ext cx="1752600" cy="266700"/>
           </a:xfrm>
           <a:noFill/>
           <a:ln>
@@ -5875,12 +5722,12 @@
           <a:lstStyle/>
           <a:p>
             <a:r>
+              <a:rPr lang="en-US" dirty="0" err="1" smtClean="0"/>
+              <a:t>recursivefunctions</a:t>
+            </a:r>
+            <a:r>
               <a:rPr lang="en-US" dirty="0" smtClean="0"/>
-              <a:t>lec </a:t>
-            </a:r>
-            <a:r>
-              <a:rPr lang="en-US" dirty="0" smtClean="0"/>
-              <a:t>4W.</a:t>
+              <a:t>.</a:t>
             </a:r>
             <a:fld id="{D747DC21-DD6C-4C9E-880E-0C721ABF6EB1}" type="slidenum">
               <a:rPr lang="en-US" smtClean="0"/>
@@ -7770,8 +7617,8 @@
         </p:nvSpPr>
         <p:spPr bwMode="auto">
           <a:xfrm>
-            <a:off x="8001000" y="6515100"/>
-            <a:ext cx="1068387" cy="304800"/>
+            <a:off x="6934200" y="6477000"/>
+            <a:ext cx="2135187" cy="342900"/>
           </a:xfrm>
           <a:noFill/>
           <a:ln>
@@ -7789,12 +7636,12 @@
           <a:lstStyle/>
           <a:p>
             <a:r>
+              <a:rPr lang="en-US" dirty="0" err="1" smtClean="0"/>
+              <a:t>recursivefunctions</a:t>
+            </a:r>
+            <a:r>
               <a:rPr lang="en-US" dirty="0" smtClean="0"/>
-              <a:t>lec </a:t>
-            </a:r>
-            <a:r>
-              <a:rPr lang="en-US" dirty="0" smtClean="0"/>
-              <a:t>4W.</a:t>
+              <a:t>.</a:t>
             </a:r>
             <a:fld id="{A4AC7DF5-7AF0-41A2-94AE-19E802825938}" type="slidenum">
               <a:rPr lang="en-US" smtClean="0"/>
@@ -9376,8 +9223,8 @@
         </p:nvSpPr>
         <p:spPr bwMode="auto">
           <a:xfrm>
-            <a:off x="8001000" y="6515100"/>
-            <a:ext cx="1068387" cy="304800"/>
+            <a:off x="7239000" y="6477000"/>
+            <a:ext cx="1830387" cy="342900"/>
           </a:xfrm>
           <a:noFill/>
           <a:ln>
@@ -9395,12 +9242,12 @@
           <a:lstStyle/>
           <a:p>
             <a:r>
+              <a:rPr lang="en-US" dirty="0" err="1" smtClean="0"/>
+              <a:t>recursivefunctions</a:t>
+            </a:r>
+            <a:r>
               <a:rPr lang="en-US" dirty="0" smtClean="0"/>
-              <a:t>lec </a:t>
-            </a:r>
-            <a:r>
-              <a:rPr lang="en-US" dirty="0" smtClean="0"/>
-              <a:t>4W.</a:t>
+              <a:t>.</a:t>
             </a:r>
             <a:fld id="{A4AC7DF5-7AF0-41A2-94AE-19E802825938}" type="slidenum">
               <a:rPr lang="en-US" smtClean="0"/>
@@ -11032,8 +10879,8 @@
         </p:nvSpPr>
         <p:spPr bwMode="auto">
           <a:xfrm>
-            <a:off x="7999413" y="6515100"/>
-            <a:ext cx="1068387" cy="304800"/>
+            <a:off x="7162801" y="6477000"/>
+            <a:ext cx="1905000" cy="342900"/>
           </a:xfrm>
           <a:noFill/>
           <a:ln>
@@ -11051,12 +10898,12 @@
           <a:lstStyle/>
           <a:p>
             <a:r>
+              <a:rPr lang="en-US" dirty="0" err="1" smtClean="0"/>
+              <a:t>recursivefunctions</a:t>
+            </a:r>
+            <a:r>
               <a:rPr lang="en-US" dirty="0" smtClean="0"/>
-              <a:t>lec </a:t>
-            </a:r>
-            <a:r>
-              <a:rPr lang="en-US" dirty="0" smtClean="0"/>
-              <a:t>4W.</a:t>
+              <a:t>.</a:t>
             </a:r>
             <a:fld id="{A4AC7DF5-7AF0-41A2-94AE-19E802825938}" type="slidenum">
               <a:rPr lang="en-US" smtClean="0"/>
@@ -12738,8 +12585,8 @@
         </p:nvSpPr>
         <p:spPr bwMode="auto">
           <a:xfrm>
-            <a:off x="7999413" y="6515100"/>
-            <a:ext cx="1068387" cy="304800"/>
+            <a:off x="7086601" y="6477000"/>
+            <a:ext cx="1981200" cy="342900"/>
           </a:xfrm>
           <a:noFill/>
           <a:ln>
@@ -12757,12 +12604,12 @@
           <a:lstStyle/>
           <a:p>
             <a:r>
+              <a:rPr lang="en-US" dirty="0" err="1" smtClean="0"/>
+              <a:t>recursivefunctions</a:t>
+            </a:r>
+            <a:r>
               <a:rPr lang="en-US" dirty="0" smtClean="0"/>
-              <a:t>lec </a:t>
-            </a:r>
-            <a:r>
-              <a:rPr lang="en-US" dirty="0" smtClean="0"/>
-              <a:t>4W.</a:t>
+              <a:t>.</a:t>
             </a:r>
             <a:fld id="{A4AC7DF5-7AF0-41A2-94AE-19E802825938}" type="slidenum">
               <a:rPr lang="en-US" smtClean="0"/>
@@ -12818,8 +12665,8 @@
         </p:nvSpPr>
         <p:spPr bwMode="auto">
           <a:xfrm>
-            <a:off x="7999413" y="6515100"/>
-            <a:ext cx="1068387" cy="304800"/>
+            <a:off x="7162801" y="6553200"/>
+            <a:ext cx="1905000" cy="266700"/>
           </a:xfrm>
           <a:noFill/>
           <a:ln>
@@ -12837,12 +12684,12 @@
           <a:lstStyle/>
           <a:p>
             <a:r>
+              <a:rPr lang="en-US" dirty="0" err="1" smtClean="0"/>
+              <a:t>recursivefunctions</a:t>
+            </a:r>
+            <a:r>
               <a:rPr lang="en-US" dirty="0" smtClean="0"/>
-              <a:t>lec </a:t>
-            </a:r>
-            <a:r>
-              <a:rPr lang="en-US" dirty="0" smtClean="0"/>
-              <a:t>4W.</a:t>
+              <a:t>.</a:t>
             </a:r>
             <a:fld id="{6CD26AEE-0E32-4926-A5A9-661FC0FA76F2}" type="slidenum">
               <a:rPr lang="en-US" smtClean="0"/>
@@ -14722,8 +14569,8 @@
         </p:nvSpPr>
         <p:spPr bwMode="auto">
           <a:xfrm>
-            <a:off x="7999413" y="6515100"/>
-            <a:ext cx="1068387" cy="304800"/>
+            <a:off x="6858001" y="6553200"/>
+            <a:ext cx="2209800" cy="266700"/>
           </a:xfrm>
           <a:noFill/>
           <a:ln>
@@ -14741,12 +14588,12 @@
           <a:lstStyle/>
           <a:p>
             <a:r>
+              <a:rPr lang="en-US" dirty="0" err="1" smtClean="0"/>
+              <a:t>recursivefunctions</a:t>
+            </a:r>
+            <a:r>
               <a:rPr lang="en-US" dirty="0" smtClean="0"/>
-              <a:t>lec </a:t>
-            </a:r>
-            <a:r>
-              <a:rPr lang="en-US" dirty="0" smtClean="0"/>
-              <a:t>4W.</a:t>
+              <a:t>.</a:t>
             </a:r>
             <a:fld id="{A4AC7DF5-7AF0-41A2-94AE-19E802825938}" type="slidenum">
               <a:rPr lang="en-US" smtClean="0"/>
@@ -16328,8 +16175,8 @@
         </p:nvSpPr>
         <p:spPr bwMode="auto">
           <a:xfrm>
-            <a:off x="7999413" y="6515100"/>
-            <a:ext cx="1068387" cy="304800"/>
+            <a:off x="6781801" y="6553200"/>
+            <a:ext cx="2286000" cy="266700"/>
           </a:xfrm>
           <a:noFill/>
           <a:ln>
@@ -16347,12 +16194,12 @@
           <a:lstStyle/>
           <a:p>
             <a:r>
+              <a:rPr lang="en-US" dirty="0" err="1" smtClean="0"/>
+              <a:t>recursivefunctions</a:t>
+            </a:r>
+            <a:r>
               <a:rPr lang="en-US" dirty="0" smtClean="0"/>
-              <a:t>lec </a:t>
-            </a:r>
-            <a:r>
-              <a:rPr lang="en-US" dirty="0" smtClean="0"/>
-              <a:t>4W.</a:t>
+              <a:t>.</a:t>
             </a:r>
             <a:fld id="{A4AC7DF5-7AF0-41A2-94AE-19E802825938}" type="slidenum">
               <a:rPr lang="en-US" smtClean="0"/>
@@ -17984,8 +17831,8 @@
         </p:nvSpPr>
         <p:spPr bwMode="auto">
           <a:xfrm>
-            <a:off x="7999413" y="6515100"/>
-            <a:ext cx="1068387" cy="304800"/>
+            <a:off x="7010401" y="6477000"/>
+            <a:ext cx="2057400" cy="342900"/>
           </a:xfrm>
           <a:noFill/>
           <a:ln>
@@ -18003,12 +17850,12 @@
           <a:lstStyle/>
           <a:p>
             <a:r>
+              <a:rPr lang="en-US" dirty="0" err="1" smtClean="0"/>
+              <a:t>recursivefunctions</a:t>
+            </a:r>
+            <a:r>
               <a:rPr lang="en-US" dirty="0" smtClean="0"/>
-              <a:t>lec </a:t>
-            </a:r>
-            <a:r>
-              <a:rPr lang="en-US" dirty="0" smtClean="0"/>
-              <a:t>4W.</a:t>
+              <a:t>.</a:t>
             </a:r>
             <a:fld id="{A4AC7DF5-7AF0-41A2-94AE-19E802825938}" type="slidenum">
               <a:rPr lang="en-US" smtClean="0"/>
@@ -18110,8 +17957,12 @@
           <a:lstStyle/>
           <a:p>
             <a:r>
+              <a:rPr lang="en-US" dirty="0" err="1" smtClean="0"/>
+              <a:t>recursivefunctions</a:t>
+            </a:r>
+            <a:r>
               <a:rPr lang="en-US" dirty="0" smtClean="0"/>
-              <a:t>4W.</a:t>
+              <a:t>.</a:t>
             </a:r>
             <a:fld id="{08969C51-7BCB-4669-B22B-E2DC6920BE01}" type="slidenum">
               <a:rPr lang="en-US" smtClean="0"/>
@@ -20213,8 +20064,8 @@
         </p:nvSpPr>
         <p:spPr bwMode="auto">
           <a:xfrm>
-            <a:off x="8001000" y="6515100"/>
-            <a:ext cx="1068387" cy="304800"/>
+            <a:off x="7162800" y="6477000"/>
+            <a:ext cx="1906587" cy="342900"/>
           </a:xfrm>
           <a:noFill/>
           <a:ln>
@@ -20232,12 +20083,12 @@
           <a:lstStyle/>
           <a:p>
             <a:r>
+              <a:rPr lang="en-US" dirty="0" err="1" smtClean="0"/>
+              <a:t>recursivefunctions</a:t>
+            </a:r>
+            <a:r>
               <a:rPr lang="en-US" dirty="0" smtClean="0"/>
-              <a:t>lec </a:t>
-            </a:r>
-            <a:r>
-              <a:rPr lang="en-US" dirty="0" smtClean="0"/>
-              <a:t>4W.</a:t>
+              <a:t>.</a:t>
             </a:r>
             <a:fld id="{A4AC7DF5-7AF0-41A2-94AE-19E802825938}" type="slidenum">
               <a:rPr lang="en-US" smtClean="0"/>
@@ -20293,8 +20144,8 @@
         </p:nvSpPr>
         <p:spPr bwMode="auto">
           <a:xfrm>
-            <a:off x="7999413" y="6515100"/>
-            <a:ext cx="1068387" cy="304800"/>
+            <a:off x="7162801" y="6477000"/>
+            <a:ext cx="1905000" cy="342900"/>
           </a:xfrm>
           <a:noFill/>
           <a:ln>
@@ -20312,12 +20163,12 @@
           <a:lstStyle/>
           <a:p>
             <a:r>
+              <a:rPr lang="en-US" dirty="0" err="1" smtClean="0"/>
+              <a:t>recursivefunctions</a:t>
+            </a:r>
+            <a:r>
               <a:rPr lang="en-US" dirty="0" smtClean="0"/>
-              <a:t>lec </a:t>
-            </a:r>
-            <a:r>
-              <a:rPr lang="en-US" dirty="0" smtClean="0"/>
-              <a:t>4W.</a:t>
+              <a:t>.</a:t>
             </a:r>
             <a:fld id="{1FF2CE9F-95BC-441B-9BF8-65FCDDEAAF9E}" type="slidenum">
               <a:rPr lang="en-US" smtClean="0"/>
@@ -20867,8 +20718,8 @@
         </p:nvSpPr>
         <p:spPr bwMode="auto">
           <a:xfrm>
-            <a:off x="7999413" y="6515100"/>
-            <a:ext cx="1068387" cy="304800"/>
+            <a:off x="7010401" y="6477000"/>
+            <a:ext cx="2057400" cy="342900"/>
           </a:xfrm>
           <a:noFill/>
           <a:ln>
@@ -20886,12 +20737,12 @@
           <a:lstStyle/>
           <a:p>
             <a:r>
+              <a:rPr lang="en-US" dirty="0" err="1" smtClean="0"/>
+              <a:t>recursivefunctions</a:t>
+            </a:r>
+            <a:r>
               <a:rPr lang="en-US" dirty="0" smtClean="0"/>
-              <a:t>lec </a:t>
-            </a:r>
-            <a:r>
-              <a:rPr lang="en-US" dirty="0" smtClean="0"/>
-              <a:t>4W.</a:t>
+              <a:t>.</a:t>
             </a:r>
             <a:fld id="{ACEA44F3-0AAF-46F8-BADD-99322BE333C9}" type="slidenum">
               <a:rPr lang="en-US" smtClean="0"/>
@@ -21472,8 +21323,8 @@
         </p:nvSpPr>
         <p:spPr bwMode="auto">
           <a:xfrm>
-            <a:off x="7999413" y="6515100"/>
-            <a:ext cx="1068387" cy="304800"/>
+            <a:off x="7315201" y="6477000"/>
+            <a:ext cx="1752600" cy="342900"/>
           </a:xfrm>
           <a:noFill/>
           <a:ln>
@@ -21491,12 +21342,12 @@
           <a:lstStyle/>
           <a:p>
             <a:r>
+              <a:rPr lang="en-US" sz="1100" dirty="0" err="1" smtClean="0"/>
+              <a:t>recursivefunctions</a:t>
+            </a:r>
+            <a:r>
               <a:rPr lang="en-US" sz="1100" dirty="0" smtClean="0"/>
-              <a:t>lec </a:t>
-            </a:r>
-            <a:r>
-              <a:rPr lang="en-US" sz="1100" dirty="0" smtClean="0"/>
-              <a:t>4W.</a:t>
+              <a:t>.</a:t>
             </a:r>
             <a:fld id="{4522ED1D-8D07-4791-96F6-DF6351C24384}" type="slidenum">
               <a:rPr lang="en-US" sz="1100" smtClean="0"/>
@@ -22799,8 +22650,8 @@
         </p:nvSpPr>
         <p:spPr bwMode="auto">
           <a:xfrm>
-            <a:off x="8153400" y="6629399"/>
-            <a:ext cx="990600" cy="228601"/>
+            <a:off x="7315200" y="6629400"/>
+            <a:ext cx="1828800" cy="228600"/>
           </a:xfrm>
           <a:noFill/>
           <a:ln>
@@ -22818,8 +22669,12 @@
           <a:lstStyle/>
           <a:p>
             <a:r>
+              <a:rPr lang="en-US" dirty="0" err="1" smtClean="0"/>
+              <a:t>recursivefunctions</a:t>
+            </a:r>
+            <a:r>
               <a:rPr lang="en-US" dirty="0" smtClean="0"/>
-              <a:t>4W.</a:t>
+              <a:t>.</a:t>
             </a:r>
             <a:fld id="{5090077E-33FC-4861-9AB3-E869C8DF45B1}" type="slidenum">
               <a:rPr lang="en-US" smtClean="0"/>
@@ -23308,8 +23163,8 @@
         </p:nvSpPr>
         <p:spPr bwMode="auto">
           <a:xfrm>
-            <a:off x="8153400" y="6629399"/>
-            <a:ext cx="990600" cy="228601"/>
+            <a:off x="7239000" y="6553201"/>
+            <a:ext cx="1905000" cy="304800"/>
           </a:xfrm>
           <a:noFill/>
           <a:ln>
@@ -23327,8 +23182,12 @@
           <a:lstStyle/>
           <a:p>
             <a:r>
+              <a:rPr lang="en-US" dirty="0" err="1" smtClean="0"/>
+              <a:t>recursivefunctions</a:t>
+            </a:r>
+            <a:r>
               <a:rPr lang="en-US" dirty="0" smtClean="0"/>
-              <a:t>4W.</a:t>
+              <a:t>.</a:t>
             </a:r>
             <a:fld id="{9115501F-E344-4697-9F2B-A97863F0B821}" type="slidenum">
               <a:rPr lang="en-US" smtClean="0"/>
@@ -23961,8 +23820,8 @@
         </p:nvSpPr>
         <p:spPr bwMode="auto">
           <a:xfrm>
-            <a:off x="8153400" y="6629399"/>
-            <a:ext cx="990600" cy="228601"/>
+            <a:off x="7010400" y="6553201"/>
+            <a:ext cx="2133600" cy="304800"/>
           </a:xfrm>
           <a:noFill/>
           <a:ln>
@@ -23980,8 +23839,12 @@
           <a:lstStyle/>
           <a:p>
             <a:r>
+              <a:rPr lang="en-US" dirty="0" err="1" smtClean="0"/>
+              <a:t>recursivefunctions</a:t>
+            </a:r>
+            <a:r>
               <a:rPr lang="en-US" dirty="0" smtClean="0"/>
-              <a:t>4W.</a:t>
+              <a:t>.</a:t>
             </a:r>
             <a:fld id="{47ABD2B9-D2BB-4906-B837-443FAD86ABA4}" type="slidenum">
               <a:rPr lang="en-US" smtClean="0"/>
@@ -24453,8 +24316,8 @@
         </p:nvSpPr>
         <p:spPr bwMode="auto">
           <a:xfrm>
-            <a:off x="8153400" y="6629399"/>
-            <a:ext cx="990600" cy="228601"/>
+            <a:off x="7010400" y="6553201"/>
+            <a:ext cx="2133600" cy="304800"/>
           </a:xfrm>
           <a:noFill/>
           <a:ln>
@@ -24472,8 +24335,12 @@
           <a:lstStyle/>
           <a:p>
             <a:r>
+              <a:rPr lang="en-US" dirty="0" err="1" smtClean="0"/>
+              <a:t>recursivefunctions</a:t>
+            </a:r>
+            <a:r>
               <a:rPr lang="en-US" dirty="0" smtClean="0"/>
-              <a:t>4W.</a:t>
+              <a:t>.</a:t>
             </a:r>
             <a:fld id="{33275EF6-C257-4EE8-AA1D-14D31FD0AA60}" type="slidenum">
               <a:rPr lang="en-US" smtClean="0"/>
@@ -25342,8 +25209,8 @@
         </p:nvSpPr>
         <p:spPr bwMode="auto">
           <a:xfrm>
-            <a:off x="8153400" y="6629399"/>
-            <a:ext cx="990600" cy="228601"/>
+            <a:off x="7162800" y="6629400"/>
+            <a:ext cx="1981200" cy="228600"/>
           </a:xfrm>
           <a:noFill/>
           <a:ln>
@@ -25361,8 +25228,12 @@
           <a:lstStyle/>
           <a:p>
             <a:r>
+              <a:rPr lang="en-US" dirty="0" err="1" smtClean="0"/>
+              <a:t>recursivefunctions</a:t>
+            </a:r>
+            <a:r>
               <a:rPr lang="en-US" dirty="0" smtClean="0"/>
-              <a:t>4W.</a:t>
+              <a:t>.</a:t>
             </a:r>
             <a:fld id="{467135F6-F9E3-456F-BEE9-F3AED511DFC8}" type="slidenum">
               <a:rPr lang="en-US" smtClean="0"/>
@@ -25812,8 +25683,8 @@
         </p:nvSpPr>
         <p:spPr>
           <a:xfrm>
-            <a:off x="8153400" y="6629399"/>
-            <a:ext cx="990600" cy="228601"/>
+            <a:off x="7162800" y="6553201"/>
+            <a:ext cx="1981200" cy="304800"/>
           </a:xfrm>
         </p:spPr>
         <p:txBody>
@@ -25824,8 +25695,12 @@
               <a:defRPr/>
             </a:pPr>
             <a:r>
+              <a:rPr lang="en-US" dirty="0" err="1" smtClean="0"/>
+              <a:t>recursivefunctions</a:t>
+            </a:r>
+            <a:r>
               <a:rPr lang="en-US" dirty="0" smtClean="0"/>
-              <a:t>4W.</a:t>
+              <a:t>.</a:t>
             </a:r>
             <a:fld id="{25EC4E35-45E7-4C88-B326-19D8E92DD37E}" type="slidenum">
               <a:rPr lang="en-US" smtClean="0"/>
@@ -26212,7 +26087,7 @@
                   <a:srgbClr val="0000FF"/>
                 </a:solidFill>
               </a:rPr>
-              <a:t>depth</a:t>
+              <a:t>tree-depth</a:t>
             </a:r>
             <a:r>
               <a:rPr lang="en-US" dirty="0" smtClean="0"/>
@@ -26261,16 +26136,16 @@
           </a:p>
           <a:p>
             <a:r>
-              <a:rPr lang="en-US" sz="5400" dirty="0" err="1" smtClean="0">
+              <a:rPr lang="en-US" sz="5400" dirty="0" smtClean="0">
                 <a:solidFill>
                   <a:srgbClr val="0000FF"/>
                 </a:solidFill>
                 <a:ea typeface="Cambria Math"/>
               </a:rPr>
-              <a:t>depth</a:t>
-            </a:r>
-            <a:r>
-              <a:rPr lang="en-US" sz="5400" dirty="0" err="1" smtClean="0">
+              <a:t>     td</a:t>
+            </a:r>
+            <a:r>
+              <a:rPr lang="en-US" sz="5400" dirty="0" smtClean="0">
                 <a:ea typeface="Cambria Math"/>
               </a:rPr>
               <a:t>(</a:t>
@@ -26287,11 +26162,32 @@
               <a:t>λ</a:t>
             </a:r>
             <a:r>
+              <a:rPr lang="en-US" sz="5400" dirty="0">
+                <a:ea typeface="Cambria Math"/>
+                <a:sym typeface="Greek Symbols"/>
+              </a:rPr>
+              <a:t>)</a:t>
+            </a:r>
+            <a:r>
               <a:rPr lang="en-US" sz="5400" dirty="0" smtClean="0">
                 <a:ea typeface="Cambria Math"/>
                 <a:sym typeface="Greek Symbols"/>
               </a:rPr>
-              <a:t>)       ::= 0</a:t>
+              <a:t> </a:t>
+            </a:r>
+            <a:r>
+              <a:rPr lang="en-US" sz="5400" dirty="0" smtClean="0">
+                <a:ea typeface="Cambria Math"/>
+                <a:sym typeface="Greek Symbols"/>
+              </a:rPr>
+              <a:t>  </a:t>
+            </a:r>
+            <a:r>
+              <a:rPr lang="en-US" sz="5400" dirty="0" smtClean="0">
+                <a:ea typeface="Cambria Math"/>
+                <a:sym typeface="Greek Symbols"/>
+              </a:rPr>
+              <a:t>::= 0</a:t>
             </a:r>
           </a:p>
           <a:p>
@@ -26302,7 +26198,7 @@
                 </a:solidFill>
                 <a:ea typeface="Cambria Math"/>
               </a:rPr>
-              <a:t>depth</a:t>
+              <a:t>td</a:t>
             </a:r>
             <a:r>
               <a:rPr lang="en-US" sz="5400" dirty="0" smtClean="0">
@@ -26319,36 +26215,28 @@
               <a:t>[</a:t>
             </a:r>
             <a:r>
-              <a:rPr lang="en-US" sz="5400" dirty="0" err="1" smtClean="0">
-                <a:solidFill>
-                  <a:srgbClr val="008000"/>
-                </a:solidFill>
-              </a:rPr>
-              <a:t>s</a:t>
-            </a:r>
-            <a:r>
-              <a:rPr lang="en-US" sz="5400" b="1" dirty="0" err="1" smtClean="0">
-                <a:solidFill>
-                  <a:srgbClr val="0000FF"/>
-                </a:solidFill>
-              </a:rPr>
-              <a:t>]</a:t>
-            </a:r>
-            <a:r>
-              <a:rPr lang="en-US" sz="5400" dirty="0" err="1" smtClean="0">
-                <a:solidFill>
-                  <a:srgbClr val="008000"/>
-                </a:solidFill>
-              </a:rPr>
-              <a:t>t</a:t>
-            </a:r>
-            <a:r>
               <a:rPr lang="en-US" sz="5400" dirty="0" smtClean="0">
                 <a:solidFill>
                   <a:srgbClr val="008000"/>
                 </a:solidFill>
               </a:rPr>
-              <a:t> </a:t>
+              <a:t>s</a:t>
+            </a:r>
+            <a:r>
+              <a:rPr lang="en-US" sz="5400" b="1" dirty="0" smtClean="0">
+                <a:solidFill>
+                  <a:srgbClr val="0000FF"/>
+                </a:solidFill>
+              </a:rPr>
+              <a:t>]</a:t>
+            </a:r>
+            <a:r>
+              <a:rPr lang="en-US" sz="5400" dirty="0" smtClean="0">
+                <a:solidFill>
+                  <a:srgbClr val="008000"/>
+                </a:solidFill>
+              </a:rPr>
+              <a:t>t </a:t>
             </a:r>
             <a:r>
               <a:rPr lang="en-US" sz="5400" dirty="0" smtClean="0">
@@ -26364,14 +26252,21 @@
                 <a:ea typeface="Cambria Math"/>
                 <a:sym typeface="Greek Symbols"/>
               </a:rPr>
-              <a:t>              </a:t>
+              <a:t>          </a:t>
             </a:r>
             <a:r>
               <a:rPr lang="en-US" sz="5400" dirty="0" smtClean="0">
                 <a:ea typeface="Cambria Math"/>
                 <a:sym typeface="Greek Symbols"/>
               </a:rPr>
-              <a:t>max{1+</a:t>
+              <a:t>1 + </a:t>
+            </a:r>
+            <a:r>
+              <a:rPr lang="en-US" sz="5400" dirty="0" smtClean="0">
+                <a:ea typeface="Cambria Math"/>
+                <a:sym typeface="Greek Symbols"/>
+              </a:rPr>
+              <a:t>max</a:t>
             </a:r>
             <a:r>
               <a:rPr lang="en-US" sz="5400" dirty="0" smtClean="0">
@@ -26381,7 +26276,7 @@
                 <a:ea typeface="Cambria Math"/>
                 <a:sym typeface="Greek Symbols"/>
               </a:rPr>
-              <a:t>d</a:t>
+              <a:t>{td</a:t>
             </a:r>
             <a:r>
               <a:rPr lang="en-US" sz="5400" dirty="0" smtClean="0">
@@ -26405,7 +26300,14 @@
                 <a:ea typeface="Cambria Math"/>
                 <a:sym typeface="Greek Symbols"/>
               </a:rPr>
-              <a:t>), </a:t>
+              <a:t>)</a:t>
+            </a:r>
+            <a:r>
+              <a:rPr lang="en-US" sz="5400" dirty="0" smtClean="0">
+                <a:ea typeface="Cambria Math"/>
+                <a:sym typeface="Greek Symbols"/>
+              </a:rPr>
+              <a:t>, </a:t>
             </a:r>
             <a:r>
               <a:rPr lang="en-US" sz="5400" dirty="0" smtClean="0">
@@ -26415,7 +26317,7 @@
                 <a:ea typeface="Cambria Math"/>
                 <a:sym typeface="Greek Symbols"/>
               </a:rPr>
-              <a:t>d</a:t>
+              <a:t>td</a:t>
             </a:r>
             <a:r>
               <a:rPr lang="en-US" sz="5400" dirty="0" smtClean="0">
@@ -26441,7 +26343,7 @@
               </a:rPr>
               <a:t>)}</a:t>
             </a:r>
-            <a:endParaRPr lang="en-US" sz="5400" dirty="0"/>
+            <a:endParaRPr lang="en-US" dirty="0"/>
           </a:p>
         </p:txBody>
       </p:sp>
@@ -26457,8 +26359,8 @@
         </p:nvSpPr>
         <p:spPr>
           <a:xfrm>
-            <a:off x="8153400" y="6629399"/>
-            <a:ext cx="990600" cy="228601"/>
+            <a:off x="7467600" y="6553201"/>
+            <a:ext cx="1676400" cy="304800"/>
           </a:xfrm>
         </p:spPr>
         <p:txBody>
@@ -26469,8 +26371,12 @@
               <a:defRPr/>
             </a:pPr>
             <a:r>
+              <a:rPr lang="en-US" dirty="0" err="1" smtClean="0"/>
+              <a:t>recursivefunctions</a:t>
+            </a:r>
+            <a:r>
               <a:rPr lang="en-US" dirty="0" smtClean="0"/>
-              <a:t>4W.</a:t>
+              <a:t>.</a:t>
             </a:r>
             <a:fld id="{25EC4E35-45E7-4C88-B326-19D8E92DD37E}" type="slidenum">
               <a:rPr lang="en-US" smtClean="0"/>
@@ -27170,8 +27076,8 @@
         </p:nvSpPr>
         <p:spPr bwMode="auto">
           <a:xfrm>
-            <a:off x="8153400" y="6629399"/>
-            <a:ext cx="990600" cy="228601"/>
+            <a:off x="7239000" y="6553201"/>
+            <a:ext cx="1905000" cy="304800"/>
           </a:xfrm>
           <a:noFill/>
           <a:ln>
@@ -27189,8 +27095,12 @@
           <a:lstStyle/>
           <a:p>
             <a:r>
+              <a:rPr lang="en-US" dirty="0" err="1" smtClean="0"/>
+              <a:t>recursivefunctions</a:t>
+            </a:r>
+            <a:r>
               <a:rPr lang="en-US" dirty="0" smtClean="0"/>
-              <a:t>4W.</a:t>
+              <a:t>.</a:t>
             </a:r>
             <a:fld id="{70021F31-2A9B-4256-9023-4F49A0CC1177}" type="slidenum">
               <a:rPr lang="en-US" smtClean="0"/>
@@ -27762,8 +27672,8 @@
         </p:nvSpPr>
         <p:spPr bwMode="auto">
           <a:xfrm>
-            <a:off x="8153400" y="6629399"/>
-            <a:ext cx="990600" cy="228601"/>
+            <a:off x="7315200" y="6553201"/>
+            <a:ext cx="1828800" cy="304800"/>
           </a:xfrm>
           <a:noFill/>
           <a:ln>
@@ -27781,8 +27691,12 @@
           <a:lstStyle/>
           <a:p>
             <a:r>
+              <a:rPr lang="en-US" dirty="0" err="1" smtClean="0"/>
+              <a:t>recursivefunctions</a:t>
+            </a:r>
+            <a:r>
               <a:rPr lang="en-US" dirty="0" smtClean="0"/>
-              <a:t>4W.</a:t>
+              <a:t>.</a:t>
             </a:r>
             <a:fld id="{07EB1CE8-A0AE-4CF6-8B95-C1E0756CCC63}" type="slidenum">
               <a:rPr lang="en-US" smtClean="0"/>
@@ -28049,8 +27963,8 @@
         </p:nvSpPr>
         <p:spPr bwMode="auto">
           <a:xfrm>
-            <a:off x="7999413" y="6515100"/>
-            <a:ext cx="1068387" cy="304800"/>
+            <a:off x="7239001" y="6553200"/>
+            <a:ext cx="1828800" cy="266700"/>
           </a:xfrm>
           <a:noFill/>
           <a:ln>
@@ -28068,12 +27982,12 @@
           <a:lstStyle/>
           <a:p>
             <a:r>
+              <a:rPr lang="en-US" dirty="0" err="1" smtClean="0"/>
+              <a:t>recursivefunctions</a:t>
+            </a:r>
+            <a:r>
               <a:rPr lang="en-US" dirty="0" smtClean="0"/>
-              <a:t>lec </a:t>
-            </a:r>
-            <a:r>
-              <a:rPr lang="en-US" dirty="0" smtClean="0"/>
-              <a:t>4W.</a:t>
+              <a:t>.</a:t>
             </a:r>
             <a:fld id="{1FF2CE9F-95BC-441B-9BF8-65FCDDEAAF9E}" type="slidenum">
               <a:rPr lang="en-US" smtClean="0"/>
@@ -28169,7 +28083,7 @@
                   <a:srgbClr val="0000FF"/>
                 </a:solidFill>
               </a:rPr>
-              <a:t>d</a:t>
+              <a:t>td</a:t>
             </a:r>
             <a:r>
               <a:rPr lang="en-US" sz="4800" baseline="30000" dirty="0" smtClean="0"/>
@@ -28244,7 +28158,7 @@
         </p:nvSpPr>
         <p:spPr bwMode="auto">
           <a:xfrm>
-            <a:off x="114300" y="2819400"/>
+            <a:off x="76200" y="2819400"/>
             <a:ext cx="8915400" cy="3733800"/>
           </a:xfrm>
           <a:prstGeom prst="rect">
@@ -28428,7 +28342,14 @@
                 <a:latin typeface="Comic Sans MS" pitchFamily="66" charset="0"/>
                 <a:sym typeface="Symbol" pitchFamily="18" charset="2"/>
               </a:rPr>
-              <a:t>= 2</a:t>
+              <a:t>= </a:t>
+            </a:r>
+            <a:r>
+              <a:rPr lang="en-US" sz="4800" dirty="0" smtClean="0">
+                <a:latin typeface="Comic Sans MS" pitchFamily="66" charset="0"/>
+                <a:sym typeface="Symbol" pitchFamily="18" charset="2"/>
+              </a:rPr>
+              <a:t>2</a:t>
             </a:r>
             <a:r>
               <a:rPr lang="en-US" sz="4800" baseline="30000" dirty="0" smtClean="0">
@@ -28437,7 +28358,7 @@
                 </a:solidFill>
                 <a:latin typeface="Comic Sans MS" pitchFamily="66" charset="0"/>
               </a:rPr>
-              <a:t>d</a:t>
+              <a:t>td</a:t>
             </a:r>
             <a:r>
               <a:rPr lang="en-US" sz="4800" baseline="30000" dirty="0" smtClean="0">
@@ -28824,8 +28745,8 @@
         </p:nvSpPr>
         <p:spPr bwMode="auto">
           <a:xfrm>
-            <a:off x="7999413" y="6515100"/>
-            <a:ext cx="1068387" cy="304800"/>
+            <a:off x="7010401" y="6553200"/>
+            <a:ext cx="2057400" cy="266700"/>
           </a:xfrm>
           <a:noFill/>
           <a:ln>
@@ -28843,12 +28764,12 @@
           <a:lstStyle/>
           <a:p>
             <a:r>
+              <a:rPr lang="en-US" dirty="0" err="1" smtClean="0"/>
+              <a:t>recursivefunctions</a:t>
+            </a:r>
+            <a:r>
               <a:rPr lang="en-US" dirty="0" smtClean="0"/>
-              <a:t>lec </a:t>
-            </a:r>
-            <a:r>
-              <a:rPr lang="en-US" dirty="0" smtClean="0"/>
-              <a:t>4W.</a:t>
+              <a:t>.</a:t>
             </a:r>
             <a:fld id="{ACEA44F3-0AAF-46F8-BADD-99322BE333C9}" type="slidenum">
               <a:rPr lang="en-US" smtClean="0"/>
@@ -29135,7 +29056,14 @@
                 <a:latin typeface="Comic Sans MS" pitchFamily="66" charset="0"/>
                 <a:sym typeface="Symbol" pitchFamily="18" charset="2"/>
               </a:rPr>
-              <a:t> 2</a:t>
+              <a:t> </a:t>
+            </a:r>
+            <a:r>
+              <a:rPr lang="en-US" sz="7200" dirty="0" smtClean="0">
+                <a:latin typeface="Comic Sans MS" pitchFamily="66" charset="0"/>
+                <a:sym typeface="Symbol" pitchFamily="18" charset="2"/>
+              </a:rPr>
+              <a:t>2</a:t>
             </a:r>
             <a:r>
               <a:rPr lang="en-US" sz="7200" baseline="30000" dirty="0" smtClean="0">
@@ -29144,7 +29072,7 @@
                 </a:solidFill>
                 <a:latin typeface="Comic Sans MS" pitchFamily="66" charset="0"/>
               </a:rPr>
-              <a:t>d</a:t>
+              <a:t>td</a:t>
             </a:r>
             <a:r>
               <a:rPr lang="en-US" sz="7200" baseline="30000" dirty="0" smtClean="0">
@@ -29216,7 +29144,7 @@
                 </a:solidFill>
                 <a:latin typeface="Comic Sans MS" pitchFamily="66" charset="0"/>
               </a:rPr>
-              <a:t>d</a:t>
+              <a:t>td</a:t>
             </a:r>
             <a:r>
               <a:rPr lang="en-US" sz="7200" baseline="30000" dirty="0" smtClean="0">
@@ -29489,8 +29417,8 @@
         </p:nvSpPr>
         <p:spPr bwMode="auto">
           <a:xfrm>
-            <a:off x="7999413" y="6515100"/>
-            <a:ext cx="1068387" cy="304800"/>
+            <a:off x="7162800" y="6553200"/>
+            <a:ext cx="1905000" cy="266700"/>
           </a:xfrm>
           <a:noFill/>
           <a:ln>
@@ -29508,12 +29436,12 @@
           <a:lstStyle/>
           <a:p>
             <a:r>
+              <a:rPr lang="en-US" sz="1100" dirty="0" err="1" smtClean="0"/>
+              <a:t>recursivefunctions</a:t>
+            </a:r>
+            <a:r>
               <a:rPr lang="en-US" sz="1100" dirty="0" smtClean="0"/>
-              <a:t>lec </a:t>
-            </a:r>
-            <a:r>
-              <a:rPr lang="en-US" sz="1100" dirty="0" smtClean="0"/>
-              <a:t>4W.</a:t>
+              <a:t>.</a:t>
             </a:r>
             <a:fld id="{4522ED1D-8D07-4791-96F6-DF6351C24384}" type="slidenum">
               <a:rPr lang="en-US" sz="1100" smtClean="0"/>
@@ -29705,7 +29633,7 @@
           <a:p>
             <a:pPr marL="0" indent="0" eaLnBrk="1" hangingPunct="1"/>
             <a:r>
-              <a:rPr lang="en-US" sz="4000" dirty="0" smtClean="0">
+              <a:rPr lang="en-US" sz="4000" b="1" dirty="0" smtClean="0">
                 <a:solidFill>
                   <a:srgbClr val="0066FF"/>
                 </a:solidFill>
@@ -29713,7 +29641,7 @@
               <a:t> </a:t>
             </a:r>
             <a:r>
-              <a:rPr lang="en-US" sz="4000" dirty="0" smtClean="0">
+              <a:rPr lang="en-US" sz="4000" b="1" dirty="0" smtClean="0">
                 <a:latin typeface="Euclid Symbol" charset="2"/>
                 <a:cs typeface="Euclid Symbol" charset="2"/>
               </a:rPr>
@@ -29723,7 +29651,13 @@
               <a:rPr lang="en-US" sz="4000" dirty="0" smtClean="0">
                 <a:sym typeface="Symbol" pitchFamily="18" charset="2"/>
               </a:rPr>
-              <a:t> 2</a:t>
+              <a:t> </a:t>
+            </a:r>
+            <a:r>
+              <a:rPr lang="en-US" sz="4000" dirty="0" smtClean="0">
+                <a:sym typeface="Symbol" pitchFamily="18" charset="2"/>
+              </a:rPr>
+              <a:t>2</a:t>
             </a:r>
             <a:r>
               <a:rPr lang="en-US" sz="4000" baseline="30000" dirty="0" smtClean="0">
@@ -29731,7 +29665,7 @@
                   <a:srgbClr val="0000FF"/>
                 </a:solidFill>
               </a:rPr>
-              <a:t>d</a:t>
+              <a:t>td</a:t>
             </a:r>
             <a:r>
               <a:rPr lang="en-US" sz="4000" baseline="30000" dirty="0" smtClean="0"/>
@@ -29765,7 +29699,7 @@
                   <a:srgbClr val="0000FF"/>
                 </a:solidFill>
               </a:rPr>
-              <a:t>d</a:t>
+              <a:t>td</a:t>
             </a:r>
             <a:r>
               <a:rPr lang="en-US" sz="4000" baseline="30000" dirty="0" smtClean="0"/>
@@ -29836,7 +29770,7 @@
               <a:t> </a:t>
             </a:r>
             <a:r>
-              <a:rPr lang="en-US" sz="4000" dirty="0" smtClean="0">
+              <a:rPr lang="en-US" sz="4000" b="1" dirty="0" smtClean="0">
                 <a:latin typeface="Euclid Symbol" charset="2"/>
                 <a:cs typeface="Euclid Symbol" charset="2"/>
               </a:rPr>
@@ -29852,7 +29786,13 @@
               <a:rPr lang="en-US" sz="4000" baseline="30000" dirty="0" smtClean="0">
                 <a:sym typeface="Symbol" pitchFamily="18" charset="2"/>
               </a:rPr>
-              <a:t>max(</a:t>
+              <a:t>max</a:t>
+            </a:r>
+            <a:r>
+              <a:rPr lang="en-US" sz="4000" baseline="30000" dirty="0" smtClean="0">
+                <a:sym typeface="Symbol" pitchFamily="18" charset="2"/>
+              </a:rPr>
+              <a:t>(</a:t>
             </a:r>
             <a:r>
               <a:rPr lang="en-US" sz="4000" baseline="30000" dirty="0" smtClean="0">
@@ -29860,7 +29800,7 @@
                   <a:srgbClr val="0000FF"/>
                 </a:solidFill>
               </a:rPr>
-              <a:t>d</a:t>
+              <a:t>td</a:t>
             </a:r>
             <a:r>
               <a:rPr lang="en-US" sz="4000" baseline="30000" dirty="0" smtClean="0"/>
@@ -29876,7 +29816,199 @@
             </a:r>
             <a:r>
               <a:rPr lang="en-US" sz="4000" baseline="30000" dirty="0" smtClean="0"/>
-              <a:t>),</a:t>
+              <a:t>)</a:t>
+            </a:r>
+            <a:r>
+              <a:rPr lang="en-US" sz="4000" baseline="30000" dirty="0" smtClean="0"/>
+              <a:t>,</a:t>
+            </a:r>
+            <a:r>
+              <a:rPr lang="en-US" sz="4000" baseline="30000" dirty="0">
+                <a:solidFill>
+                  <a:srgbClr val="0000FF"/>
+                </a:solidFill>
+              </a:rPr>
+              <a:t>td</a:t>
+            </a:r>
+            <a:r>
+              <a:rPr lang="en-US" sz="4000" baseline="30000" dirty="0" smtClean="0"/>
+              <a:t>(</a:t>
+            </a:r>
+            <a:r>
+              <a:rPr lang="en-US" sz="4000" baseline="30000" dirty="0" smtClean="0">
+                <a:solidFill>
+                  <a:srgbClr val="008000"/>
+                </a:solidFill>
+              </a:rPr>
+              <a:t>t</a:t>
+            </a:r>
+            <a:r>
+              <a:rPr lang="en-US" sz="4000" baseline="30000" dirty="0" smtClean="0"/>
+              <a:t>))+1 </a:t>
+            </a:r>
+            <a:r>
+              <a:rPr lang="en-US" sz="4000" dirty="0" smtClean="0">
+                <a:sym typeface="Symbol" pitchFamily="18" charset="2"/>
+              </a:rPr>
+              <a:t>+ 2</a:t>
+            </a:r>
+            <a:r>
+              <a:rPr lang="en-US" sz="4000" baseline="30000" dirty="0" smtClean="0">
+                <a:sym typeface="Symbol" pitchFamily="18" charset="2"/>
+              </a:rPr>
+              <a:t>max</a:t>
+            </a:r>
+            <a:r>
+              <a:rPr lang="en-US" sz="4000" baseline="30000" dirty="0" smtClean="0">
+                <a:sym typeface="Symbol" pitchFamily="18" charset="2"/>
+              </a:rPr>
+              <a:t>(</a:t>
+            </a:r>
+            <a:r>
+              <a:rPr lang="en-US" sz="4000" baseline="30000" dirty="0">
+                <a:solidFill>
+                  <a:srgbClr val="0000FF"/>
+                </a:solidFill>
+              </a:rPr>
+              <a:t>td</a:t>
+            </a:r>
+            <a:r>
+              <a:rPr lang="en-US" sz="4000" baseline="30000" dirty="0" smtClean="0"/>
+              <a:t>(</a:t>
+            </a:r>
+            <a:r>
+              <a:rPr lang="en-US" sz="4000" baseline="30000" dirty="0" smtClean="0">
+                <a:solidFill>
+                  <a:srgbClr val="008000"/>
+                </a:solidFill>
+              </a:rPr>
+              <a:t>s</a:t>
+            </a:r>
+            <a:r>
+              <a:rPr lang="en-US" sz="4000" baseline="30000" dirty="0" smtClean="0"/>
+              <a:t>)</a:t>
+            </a:r>
+            <a:r>
+              <a:rPr lang="en-US" sz="4000" baseline="30000" dirty="0" smtClean="0"/>
+              <a:t>,</a:t>
+            </a:r>
+            <a:r>
+              <a:rPr lang="en-US" sz="4000" baseline="30000" dirty="0">
+                <a:solidFill>
+                  <a:srgbClr val="0000FF"/>
+                </a:solidFill>
+              </a:rPr>
+              <a:t>td</a:t>
+            </a:r>
+            <a:r>
+              <a:rPr lang="en-US" sz="4000" baseline="30000" dirty="0" smtClean="0"/>
+              <a:t>(</a:t>
+            </a:r>
+            <a:r>
+              <a:rPr lang="en-US" sz="4000" baseline="30000" dirty="0" smtClean="0">
+                <a:solidFill>
+                  <a:srgbClr val="008000"/>
+                </a:solidFill>
+              </a:rPr>
+              <a:t>t</a:t>
+            </a:r>
+            <a:r>
+              <a:rPr lang="en-US" sz="4000" baseline="30000" dirty="0" smtClean="0"/>
+              <a:t>))+1</a:t>
+            </a:r>
+          </a:p>
+          <a:p>
+            <a:pPr marL="0" indent="0" eaLnBrk="1" hangingPunct="1"/>
+            <a:r>
+              <a:rPr lang="en-US" sz="4000" dirty="0" smtClean="0">
+                <a:sym typeface="Symbol" pitchFamily="18" charset="2"/>
+              </a:rPr>
+              <a:t> = 2·2</a:t>
+            </a:r>
+            <a:r>
+              <a:rPr lang="en-US" sz="4000" baseline="30000" dirty="0" smtClean="0">
+                <a:sym typeface="Symbol" pitchFamily="18" charset="2"/>
+              </a:rPr>
+              <a:t>max</a:t>
+            </a:r>
+            <a:r>
+              <a:rPr lang="en-US" sz="4000" baseline="30000" dirty="0" smtClean="0">
+                <a:sym typeface="Symbol" pitchFamily="18" charset="2"/>
+              </a:rPr>
+              <a:t>(</a:t>
+            </a:r>
+            <a:r>
+              <a:rPr lang="en-US" sz="4000" baseline="30000" dirty="0">
+                <a:solidFill>
+                  <a:srgbClr val="0000FF"/>
+                </a:solidFill>
+              </a:rPr>
+              <a:t>td</a:t>
+            </a:r>
+            <a:r>
+              <a:rPr lang="en-US" sz="4000" baseline="30000" dirty="0" smtClean="0"/>
+              <a:t>(</a:t>
+            </a:r>
+            <a:r>
+              <a:rPr lang="en-US" sz="4000" baseline="30000" dirty="0" smtClean="0">
+                <a:solidFill>
+                  <a:srgbClr val="008000"/>
+                </a:solidFill>
+              </a:rPr>
+              <a:t>s</a:t>
+            </a:r>
+            <a:r>
+              <a:rPr lang="en-US" sz="4000" baseline="30000" dirty="0" smtClean="0"/>
+              <a:t>)</a:t>
+            </a:r>
+            <a:r>
+              <a:rPr lang="en-US" sz="4000" baseline="30000" dirty="0" smtClean="0"/>
+              <a:t>,</a:t>
+            </a:r>
+            <a:r>
+              <a:rPr lang="en-US" sz="4000" baseline="30000" dirty="0">
+                <a:solidFill>
+                  <a:srgbClr val="0000FF"/>
+                </a:solidFill>
+              </a:rPr>
+              <a:t>td</a:t>
+            </a:r>
+            <a:r>
+              <a:rPr lang="en-US" sz="4000" baseline="30000" dirty="0" smtClean="0"/>
+              <a:t>(</a:t>
+            </a:r>
+            <a:r>
+              <a:rPr lang="en-US" sz="4000" baseline="30000" dirty="0" smtClean="0">
+                <a:solidFill>
+                  <a:srgbClr val="008000"/>
+                </a:solidFill>
+              </a:rPr>
+              <a:t>t</a:t>
+            </a:r>
+            <a:r>
+              <a:rPr lang="en-US" sz="4000" baseline="30000" dirty="0" smtClean="0"/>
+              <a:t>))+1 </a:t>
+            </a:r>
+            <a:r>
+              <a:rPr lang="en-US" sz="4000" b="1" dirty="0" smtClean="0">
+                <a:latin typeface="Euclid Symbol" charset="2"/>
+                <a:cs typeface="Euclid Symbol" charset="2"/>
+              </a:rPr>
+              <a:t>≤</a:t>
+            </a:r>
+            <a:r>
+              <a:rPr lang="en-US" sz="4000" dirty="0" smtClean="0"/>
+              <a:t> </a:t>
+            </a:r>
+            <a:r>
+              <a:rPr lang="en-US" sz="4000" dirty="0" smtClean="0"/>
+              <a:t>2·</a:t>
+            </a:r>
+            <a:r>
+              <a:rPr lang="en-US" sz="4000" dirty="0" smtClean="0">
+                <a:sym typeface="Symbol" pitchFamily="18" charset="2"/>
+              </a:rPr>
+              <a:t>2</a:t>
             </a:r>
             <a:r>
               <a:rPr lang="en-US" sz="4000" baseline="30000" dirty="0" smtClean="0">
@@ -29884,160 +30016,11 @@
                   <a:srgbClr val="0000FF"/>
                 </a:solidFill>
               </a:rPr>
-              <a:t>d</a:t>
+              <a:t>td</a:t>
             </a:r>
             <a:r>
               <a:rPr lang="en-US" sz="4000" baseline="30000" dirty="0" smtClean="0"/>
               <a:t>(</a:t>
-            </a:r>
-            <a:r>
-              <a:rPr lang="en-US" sz="4000" baseline="30000" dirty="0" smtClean="0">
-                <a:solidFill>
-                  <a:srgbClr val="008000"/>
-                </a:solidFill>
-              </a:rPr>
-              <a:t>t</a:t>
-            </a:r>
-            <a:r>
-              <a:rPr lang="en-US" sz="4000" baseline="30000" dirty="0" smtClean="0"/>
-              <a:t>))+1 </a:t>
-            </a:r>
-            <a:r>
-              <a:rPr lang="en-US" sz="4000" dirty="0" smtClean="0">
-                <a:sym typeface="Symbol" pitchFamily="18" charset="2"/>
-              </a:rPr>
-              <a:t>+ 2</a:t>
-            </a:r>
-            <a:r>
-              <a:rPr lang="en-US" sz="4000" baseline="30000" dirty="0" smtClean="0">
-                <a:sym typeface="Symbol" pitchFamily="18" charset="2"/>
-              </a:rPr>
-              <a:t>max(</a:t>
-            </a:r>
-            <a:r>
-              <a:rPr lang="en-US" sz="4000" baseline="30000" dirty="0" smtClean="0">
-                <a:solidFill>
-                  <a:srgbClr val="0000FF"/>
-                </a:solidFill>
-              </a:rPr>
-              <a:t>d</a:t>
-            </a:r>
-            <a:r>
-              <a:rPr lang="en-US" sz="4000" baseline="30000" dirty="0" smtClean="0"/>
-              <a:t>(</a:t>
-            </a:r>
-            <a:r>
-              <a:rPr lang="en-US" sz="4000" baseline="30000" dirty="0" smtClean="0">
-                <a:solidFill>
-                  <a:srgbClr val="008000"/>
-                </a:solidFill>
-              </a:rPr>
-              <a:t>s</a:t>
-            </a:r>
-            <a:r>
-              <a:rPr lang="en-US" sz="4000" baseline="30000" dirty="0" smtClean="0"/>
-              <a:t>),</a:t>
-            </a:r>
-            <a:r>
-              <a:rPr lang="en-US" sz="4000" baseline="30000" dirty="0" smtClean="0">
-                <a:solidFill>
-                  <a:srgbClr val="0000FF"/>
-                </a:solidFill>
-              </a:rPr>
-              <a:t>d</a:t>
-            </a:r>
-            <a:r>
-              <a:rPr lang="en-US" sz="4000" baseline="30000" dirty="0" smtClean="0"/>
-              <a:t>(</a:t>
-            </a:r>
-            <a:r>
-              <a:rPr lang="en-US" sz="4000" baseline="30000" dirty="0" smtClean="0">
-                <a:solidFill>
-                  <a:srgbClr val="008000"/>
-                </a:solidFill>
-              </a:rPr>
-              <a:t>t</a:t>
-            </a:r>
-            <a:r>
-              <a:rPr lang="en-US" sz="4000" baseline="30000" dirty="0" smtClean="0"/>
-              <a:t>))+1</a:t>
-            </a:r>
-          </a:p>
-          <a:p>
-            <a:pPr marL="0" indent="0" eaLnBrk="1" hangingPunct="1"/>
-            <a:r>
-              <a:rPr lang="en-US" sz="4000" dirty="0" smtClean="0">
-                <a:sym typeface="Symbol" pitchFamily="18" charset="2"/>
-              </a:rPr>
-              <a:t> = 2·2</a:t>
-            </a:r>
-            <a:r>
-              <a:rPr lang="en-US" sz="4000" baseline="30000" dirty="0" smtClean="0">
-                <a:sym typeface="Symbol" pitchFamily="18" charset="2"/>
-              </a:rPr>
-              <a:t>max(</a:t>
-            </a:r>
-            <a:r>
-              <a:rPr lang="en-US" sz="4000" baseline="30000" dirty="0" smtClean="0">
-                <a:solidFill>
-                  <a:srgbClr val="0000FF"/>
-                </a:solidFill>
-              </a:rPr>
-              <a:t>d</a:t>
-            </a:r>
-            <a:r>
-              <a:rPr lang="en-US" sz="4000" baseline="30000" dirty="0" smtClean="0"/>
-              <a:t>(</a:t>
-            </a:r>
-            <a:r>
-              <a:rPr lang="en-US" sz="4000" baseline="30000" dirty="0" smtClean="0">
-                <a:solidFill>
-                  <a:srgbClr val="008000"/>
-                </a:solidFill>
-              </a:rPr>
-              <a:t>s</a:t>
-            </a:r>
-            <a:r>
-              <a:rPr lang="en-US" sz="4000" baseline="30000" dirty="0" smtClean="0"/>
-              <a:t>),</a:t>
-            </a:r>
-            <a:r>
-              <a:rPr lang="en-US" sz="4000" baseline="30000" dirty="0" smtClean="0">
-                <a:solidFill>
-                  <a:srgbClr val="0000FF"/>
-                </a:solidFill>
-              </a:rPr>
-              <a:t>d</a:t>
-            </a:r>
-            <a:r>
-              <a:rPr lang="en-US" sz="4000" baseline="30000" dirty="0" smtClean="0"/>
-              <a:t>(</a:t>
-            </a:r>
-            <a:r>
-              <a:rPr lang="en-US" sz="4000" baseline="30000" dirty="0" smtClean="0">
-                <a:solidFill>
-                  <a:srgbClr val="008000"/>
-                </a:solidFill>
-              </a:rPr>
-              <a:t>t</a:t>
-            </a:r>
-            <a:r>
-              <a:rPr lang="en-US" sz="4000" baseline="30000" dirty="0" smtClean="0"/>
-              <a:t>))+1 </a:t>
-            </a:r>
-            <a:r>
-              <a:rPr lang="en-US" sz="4000" dirty="0" smtClean="0"/>
-              <a:t> = 2·</a:t>
-            </a:r>
-            <a:r>
-              <a:rPr lang="en-US" sz="4000" dirty="0" smtClean="0">
-                <a:sym typeface="Symbol" pitchFamily="18" charset="2"/>
-              </a:rPr>
-              <a:t>2</a:t>
-            </a:r>
-            <a:r>
-              <a:rPr lang="en-US" sz="4000" baseline="30000" dirty="0" smtClean="0"/>
-              <a:t>d(</a:t>
             </a:r>
             <a:r>
               <a:rPr lang="en-US" sz="4000" baseline="30000" dirty="0" smtClean="0">
@@ -30126,12 +30109,12 @@
               <a:t>2</a:t>
             </a:r>
             <a:r>
-              <a:rPr lang="en-US" sz="5400" baseline="30000" dirty="0" smtClean="0">
+              <a:rPr lang="en-US" sz="5400" baseline="30000" dirty="0">
                 <a:solidFill>
                   <a:srgbClr val="0000FF"/>
                 </a:solidFill>
               </a:rPr>
-              <a:t>d</a:t>
+              <a:t>td</a:t>
             </a:r>
             <a:r>
               <a:rPr lang="en-US" sz="5400" baseline="30000" dirty="0" smtClean="0"/>
@@ -30748,8 +30731,8 @@
         </p:nvSpPr>
         <p:spPr bwMode="auto">
           <a:xfrm>
-            <a:off x="7999413" y="6515100"/>
-            <a:ext cx="1068387" cy="304800"/>
+            <a:off x="7391401" y="6553200"/>
+            <a:ext cx="1676400" cy="266700"/>
           </a:xfrm>
           <a:noFill/>
           <a:ln>
@@ -30767,12 +30750,12 @@
           <a:lstStyle/>
           <a:p>
             <a:r>
+              <a:rPr lang="en-US" dirty="0" err="1" smtClean="0"/>
+              <a:t>recursivefunctions</a:t>
+            </a:r>
+            <a:r>
               <a:rPr lang="en-US" dirty="0" smtClean="0"/>
-              <a:t>lec </a:t>
-            </a:r>
-            <a:r>
-              <a:rPr lang="en-US" dirty="0" smtClean="0"/>
-              <a:t>4W.</a:t>
+              <a:t>.</a:t>
             </a:r>
             <a:fld id="{F31D554E-2255-4599-BA72-F7A6D7F0B795}" type="slidenum">
               <a:rPr lang="en-US" smtClean="0"/>

</xml_diff>